<commit_message>
ppts for initial deployment and rolling update - minor
</commit_message>
<xml_diff>
--- a/docker-kubernetes-intro-starting-a-project.pptx
+++ b/docker-kubernetes-intro-starting-a-project.pptx
@@ -15361,7 +15361,29 @@
                 <a:ea typeface="+mj-ea"/>
                 <a:cs typeface="Arial" pitchFamily="34" charset="0"/>
               </a:rPr>
-              <a:t>3. The Demo Project</a:t>
+              <a:t>Deployment process visualized:</a:t>
+            </a:r>
+            <a:r>
+              <a:rPr lang="en-US" sz="2800" b="1" dirty="0" smtClean="0">
+                <a:gradFill>
+                  <a:gsLst>
+                    <a:gs pos="0">
+                      <a:schemeClr val="tx1"/>
+                    </a:gs>
+                    <a:gs pos="44000">
+                      <a:srgbClr val="01BBBB"/>
+                    </a:gs>
+                    <a:gs pos="100000">
+                      <a:schemeClr val="accent4"/>
+                    </a:gs>
+                  </a:gsLst>
+                  <a:lin ang="4800000" scaled="0"/>
+                </a:gradFill>
+                <a:latin typeface="Arial" pitchFamily="34" charset="0"/>
+                <a:ea typeface="+mj-ea"/>
+                <a:cs typeface="Arial" pitchFamily="34" charset="0"/>
+              </a:rPr>
+              <a:t> </a:t>
             </a:r>
             <a:endParaRPr lang="en-US" sz="2800" b="1" dirty="0">
               <a:gradFill>
@@ -15394,7 +15416,10 @@
           <p:nvPr/>
         </p:nvPicPr>
         <p:blipFill>
-          <a:blip r:embed="rId3"/>
+          <a:blip r:embed="rId3">
+            <a:alphaModFix/>
+            <a:grayscl/>
+          </a:blip>
           <a:stretch>
             <a:fillRect/>
           </a:stretch>

</xml_diff>

<commit_message>
replication for cluster added
</commit_message>
<xml_diff>
--- a/docker-kubernetes-intro-starting-a-project.pptx
+++ b/docker-kubernetes-intro-starting-a-project.pptx
@@ -1095,14 +1095,35 @@
         </dgm:presLayoutVars>
       </dgm:prSet>
       <dgm:spPr/>
+      <dgm:t>
+        <a:bodyPr/>
+        <a:lstStyle/>
+        <a:p>
+          <a:endParaRPr lang="en-US"/>
+        </a:p>
+      </dgm:t>
     </dgm:pt>
     <dgm:pt modelId="{259FAD5D-155A-5E42-9899-9EC9730A809C}" type="pres">
       <dgm:prSet presAssocID="{D0CC6D41-68A5-5D4F-8468-B367AE4E18F1}" presName="sibTrans" presStyleLbl="sibTrans2D1" presStyleIdx="0" presStyleCnt="3"/>
       <dgm:spPr/>
+      <dgm:t>
+        <a:bodyPr/>
+        <a:lstStyle/>
+        <a:p>
+          <a:endParaRPr lang="en-US"/>
+        </a:p>
+      </dgm:t>
     </dgm:pt>
     <dgm:pt modelId="{30DCF6B7-7B1A-E04F-9094-8F1A311A69F1}" type="pres">
       <dgm:prSet presAssocID="{D0CC6D41-68A5-5D4F-8468-B367AE4E18F1}" presName="connectorText" presStyleLbl="sibTrans2D1" presStyleIdx="0" presStyleCnt="3"/>
       <dgm:spPr/>
+      <dgm:t>
+        <a:bodyPr/>
+        <a:lstStyle/>
+        <a:p>
+          <a:endParaRPr lang="en-US"/>
+        </a:p>
+      </dgm:t>
     </dgm:pt>
     <dgm:pt modelId="{9DB26237-DC39-284C-BBDC-6225068F89E4}" type="pres">
       <dgm:prSet presAssocID="{E3C17EF8-8718-5248-842B-7F516B2C6F56}" presName="node" presStyleLbl="node1" presStyleIdx="1" presStyleCnt="4" custLinFactNeighborY="-3226">
@@ -1122,10 +1143,24 @@
     <dgm:pt modelId="{6B97343A-1385-D34A-9670-FF37BE4D85F2}" type="pres">
       <dgm:prSet presAssocID="{E05E6CA6-4FEE-F643-AE28-35111AC75101}" presName="sibTrans" presStyleLbl="sibTrans2D1" presStyleIdx="1" presStyleCnt="3"/>
       <dgm:spPr/>
+      <dgm:t>
+        <a:bodyPr/>
+        <a:lstStyle/>
+        <a:p>
+          <a:endParaRPr lang="en-US"/>
+        </a:p>
+      </dgm:t>
     </dgm:pt>
     <dgm:pt modelId="{9451B73C-3DCE-574D-968D-C725996CB44B}" type="pres">
       <dgm:prSet presAssocID="{E05E6CA6-4FEE-F643-AE28-35111AC75101}" presName="connectorText" presStyleLbl="sibTrans2D1" presStyleIdx="1" presStyleCnt="3"/>
       <dgm:spPr/>
+      <dgm:t>
+        <a:bodyPr/>
+        <a:lstStyle/>
+        <a:p>
+          <a:endParaRPr lang="en-US"/>
+        </a:p>
+      </dgm:t>
     </dgm:pt>
     <dgm:pt modelId="{28C14F32-7EF2-2748-A38C-6E2FE8336B6F}" type="pres">
       <dgm:prSet presAssocID="{694A1D72-5933-7E45-9A79-23BE775DC946}" presName="node" presStyleLbl="node1" presStyleIdx="2" presStyleCnt="4">
@@ -1134,14 +1169,35 @@
         </dgm:presLayoutVars>
       </dgm:prSet>
       <dgm:spPr/>
+      <dgm:t>
+        <a:bodyPr/>
+        <a:lstStyle/>
+        <a:p>
+          <a:endParaRPr lang="en-US"/>
+        </a:p>
+      </dgm:t>
     </dgm:pt>
     <dgm:pt modelId="{DF82FA8E-140E-414E-AE40-DBBD40A40B43}" type="pres">
       <dgm:prSet presAssocID="{4CE8D523-28E7-D048-A0E4-5668170983C1}" presName="sibTrans" presStyleLbl="sibTrans2D1" presStyleIdx="2" presStyleCnt="3"/>
       <dgm:spPr/>
+      <dgm:t>
+        <a:bodyPr/>
+        <a:lstStyle/>
+        <a:p>
+          <a:endParaRPr lang="en-US"/>
+        </a:p>
+      </dgm:t>
     </dgm:pt>
     <dgm:pt modelId="{C277C964-F51F-A449-9BEC-B3DE016F19E7}" type="pres">
       <dgm:prSet presAssocID="{4CE8D523-28E7-D048-A0E4-5668170983C1}" presName="connectorText" presStyleLbl="sibTrans2D1" presStyleIdx="2" presStyleCnt="3"/>
       <dgm:spPr/>
+      <dgm:t>
+        <a:bodyPr/>
+        <a:lstStyle/>
+        <a:p>
+          <a:endParaRPr lang="en-US"/>
+        </a:p>
+      </dgm:t>
     </dgm:pt>
     <dgm:pt modelId="{2DECA85C-9C11-3945-A74D-7024E14E3221}" type="pres">
       <dgm:prSet presAssocID="{A7335D52-71DE-E048-BE0A-EF80B425A200}" presName="node" presStyleLbl="node1" presStyleIdx="3" presStyleCnt="4">
@@ -1160,21 +1216,21 @@
     </dgm:pt>
   </dgm:ptLst>
   <dgm:cxnLst>
+    <dgm:cxn modelId="{E4D1C42F-3BCE-854C-97ED-BEE6A0169F52}" srcId="{AD60282E-7807-DF4D-855D-FC8388C1FA86}" destId="{A7335D52-71DE-E048-BE0A-EF80B425A200}" srcOrd="3" destOrd="0" parTransId="{C2FD43D3-64EE-B744-A903-B0C7171B6D5E}" sibTransId="{0D4ABE1A-3EBB-A14E-B992-0E21C992A1BF}"/>
+    <dgm:cxn modelId="{9F9501F9-C79D-C942-A03F-F68209F76402}" type="presOf" srcId="{694A1D72-5933-7E45-9A79-23BE775DC946}" destId="{28C14F32-7EF2-2748-A38C-6E2FE8336B6F}" srcOrd="0" destOrd="0" presId="urn:microsoft.com/office/officeart/2005/8/layout/process1"/>
+    <dgm:cxn modelId="{E62A05B3-FA56-5040-A5E6-029E288E96DF}" srcId="{AD60282E-7807-DF4D-855D-FC8388C1FA86}" destId="{694A1D72-5933-7E45-9A79-23BE775DC946}" srcOrd="2" destOrd="0" parTransId="{877A9A04-C149-DD46-9F3A-434984E0FE80}" sibTransId="{4CE8D523-28E7-D048-A0E4-5668170983C1}"/>
     <dgm:cxn modelId="{61DD1671-2FB2-D54C-BA28-0C17756B746F}" type="presOf" srcId="{4CE8D523-28E7-D048-A0E4-5668170983C1}" destId="{DF82FA8E-140E-414E-AE40-DBBD40A40B43}" srcOrd="0" destOrd="0" presId="urn:microsoft.com/office/officeart/2005/8/layout/process1"/>
+    <dgm:cxn modelId="{8CA60554-A41E-1F42-8DC8-C2F9D1E29C50}" type="presOf" srcId="{E05E6CA6-4FEE-F643-AE28-35111AC75101}" destId="{9451B73C-3DCE-574D-968D-C725996CB44B}" srcOrd="1" destOrd="0" presId="urn:microsoft.com/office/officeart/2005/8/layout/process1"/>
     <dgm:cxn modelId="{55FA139D-FAB9-814B-952F-7F7E63767DA7}" type="presOf" srcId="{D0CC6D41-68A5-5D4F-8468-B367AE4E18F1}" destId="{30DCF6B7-7B1A-E04F-9094-8F1A311A69F1}" srcOrd="1" destOrd="0" presId="urn:microsoft.com/office/officeart/2005/8/layout/process1"/>
+    <dgm:cxn modelId="{C87964D1-B516-5548-BB63-233A1EAEB86B}" srcId="{AD60282E-7807-DF4D-855D-FC8388C1FA86}" destId="{E3C17EF8-8718-5248-842B-7F516B2C6F56}" srcOrd="1" destOrd="0" parTransId="{1D6F41A0-0C98-014A-9E47-BD22E09DFAF6}" sibTransId="{E05E6CA6-4FEE-F643-AE28-35111AC75101}"/>
+    <dgm:cxn modelId="{EE6E1D1D-0497-6240-AD33-BC4E8789B4D8}" type="presOf" srcId="{AD60282E-7807-DF4D-855D-FC8388C1FA86}" destId="{F4EA08AA-9B67-7746-ACA4-2F534B3BCAAD}" srcOrd="0" destOrd="0" presId="urn:microsoft.com/office/officeart/2005/8/layout/process1"/>
+    <dgm:cxn modelId="{8534A984-0E26-A048-B771-E39125ACCD5B}" type="presOf" srcId="{A7335D52-71DE-E048-BE0A-EF80B425A200}" destId="{2DECA85C-9C11-3945-A74D-7024E14E3221}" srcOrd="0" destOrd="0" presId="urn:microsoft.com/office/officeart/2005/8/layout/process1"/>
+    <dgm:cxn modelId="{5563180E-9B94-4C40-9254-BD30231613BF}" type="presOf" srcId="{E05E6CA6-4FEE-F643-AE28-35111AC75101}" destId="{6B97343A-1385-D34A-9670-FF37BE4D85F2}" srcOrd="0" destOrd="0" presId="urn:microsoft.com/office/officeart/2005/8/layout/process1"/>
+    <dgm:cxn modelId="{4A907B49-9BA6-C545-B72B-061AFD201EED}" type="presOf" srcId="{E3C17EF8-8718-5248-842B-7F516B2C6F56}" destId="{9DB26237-DC39-284C-BBDC-6225068F89E4}" srcOrd="0" destOrd="0" presId="urn:microsoft.com/office/officeart/2005/8/layout/process1"/>
     <dgm:cxn modelId="{CD1B1FCC-EA3B-6F43-AA58-7909A9D760D4}" type="presOf" srcId="{4CE8D523-28E7-D048-A0E4-5668170983C1}" destId="{C277C964-F51F-A449-9BEC-B3DE016F19E7}" srcOrd="1" destOrd="0" presId="urn:microsoft.com/office/officeart/2005/8/layout/process1"/>
-    <dgm:cxn modelId="{E4D1C42F-3BCE-854C-97ED-BEE6A0169F52}" srcId="{AD60282E-7807-DF4D-855D-FC8388C1FA86}" destId="{A7335D52-71DE-E048-BE0A-EF80B425A200}" srcOrd="3" destOrd="0" parTransId="{C2FD43D3-64EE-B744-A903-B0C7171B6D5E}" sibTransId="{0D4ABE1A-3EBB-A14E-B992-0E21C992A1BF}"/>
-    <dgm:cxn modelId="{5563180E-9B94-4C40-9254-BD30231613BF}" type="presOf" srcId="{E05E6CA6-4FEE-F643-AE28-35111AC75101}" destId="{6B97343A-1385-D34A-9670-FF37BE4D85F2}" srcOrd="0" destOrd="0" presId="urn:microsoft.com/office/officeart/2005/8/layout/process1"/>
-    <dgm:cxn modelId="{8CA60554-A41E-1F42-8DC8-C2F9D1E29C50}" type="presOf" srcId="{E05E6CA6-4FEE-F643-AE28-35111AC75101}" destId="{9451B73C-3DCE-574D-968D-C725996CB44B}" srcOrd="1" destOrd="0" presId="urn:microsoft.com/office/officeart/2005/8/layout/process1"/>
-    <dgm:cxn modelId="{9F9501F9-C79D-C942-A03F-F68209F76402}" type="presOf" srcId="{694A1D72-5933-7E45-9A79-23BE775DC946}" destId="{28C14F32-7EF2-2748-A38C-6E2FE8336B6F}" srcOrd="0" destOrd="0" presId="urn:microsoft.com/office/officeart/2005/8/layout/process1"/>
+    <dgm:cxn modelId="{A8642848-4C70-7F46-87C1-7D25239F2E06}" type="presOf" srcId="{D0CC6D41-68A5-5D4F-8468-B367AE4E18F1}" destId="{259FAD5D-155A-5E42-9899-9EC9730A809C}" srcOrd="0" destOrd="0" presId="urn:microsoft.com/office/officeart/2005/8/layout/process1"/>
     <dgm:cxn modelId="{763814C6-C8EC-C742-959F-CAB26BCBC3D3}" type="presOf" srcId="{C1FA95AD-9966-1A41-9B89-8F1821EB2558}" destId="{504508B6-3F34-8741-8E3D-82122E32EDD7}" srcOrd="0" destOrd="0" presId="urn:microsoft.com/office/officeart/2005/8/layout/process1"/>
-    <dgm:cxn modelId="{4A907B49-9BA6-C545-B72B-061AFD201EED}" type="presOf" srcId="{E3C17EF8-8718-5248-842B-7F516B2C6F56}" destId="{9DB26237-DC39-284C-BBDC-6225068F89E4}" srcOrd="0" destOrd="0" presId="urn:microsoft.com/office/officeart/2005/8/layout/process1"/>
-    <dgm:cxn modelId="{EE6E1D1D-0497-6240-AD33-BC4E8789B4D8}" type="presOf" srcId="{AD60282E-7807-DF4D-855D-FC8388C1FA86}" destId="{F4EA08AA-9B67-7746-ACA4-2F534B3BCAAD}" srcOrd="0" destOrd="0" presId="urn:microsoft.com/office/officeart/2005/8/layout/process1"/>
-    <dgm:cxn modelId="{A8642848-4C70-7F46-87C1-7D25239F2E06}" type="presOf" srcId="{D0CC6D41-68A5-5D4F-8468-B367AE4E18F1}" destId="{259FAD5D-155A-5E42-9899-9EC9730A809C}" srcOrd="0" destOrd="0" presId="urn:microsoft.com/office/officeart/2005/8/layout/process1"/>
-    <dgm:cxn modelId="{8534A984-0E26-A048-B771-E39125ACCD5B}" type="presOf" srcId="{A7335D52-71DE-E048-BE0A-EF80B425A200}" destId="{2DECA85C-9C11-3945-A74D-7024E14E3221}" srcOrd="0" destOrd="0" presId="urn:microsoft.com/office/officeart/2005/8/layout/process1"/>
-    <dgm:cxn modelId="{E62A05B3-FA56-5040-A5E6-029E288E96DF}" srcId="{AD60282E-7807-DF4D-855D-FC8388C1FA86}" destId="{694A1D72-5933-7E45-9A79-23BE775DC946}" srcOrd="2" destOrd="0" parTransId="{877A9A04-C149-DD46-9F3A-434984E0FE80}" sibTransId="{4CE8D523-28E7-D048-A0E4-5668170983C1}"/>
     <dgm:cxn modelId="{888BDFC9-CEFE-4B41-90A5-A0C46825A334}" srcId="{AD60282E-7807-DF4D-855D-FC8388C1FA86}" destId="{C1FA95AD-9966-1A41-9B89-8F1821EB2558}" srcOrd="0" destOrd="0" parTransId="{58DFF9E3-B7E3-AF4C-804B-4DC1EA79DA60}" sibTransId="{D0CC6D41-68A5-5D4F-8468-B367AE4E18F1}"/>
-    <dgm:cxn modelId="{C87964D1-B516-5548-BB63-233A1EAEB86B}" srcId="{AD60282E-7807-DF4D-855D-FC8388C1FA86}" destId="{E3C17EF8-8718-5248-842B-7F516B2C6F56}" srcOrd="1" destOrd="0" parTransId="{1D6F41A0-0C98-014A-9E47-BD22E09DFAF6}" sibTransId="{E05E6CA6-4FEE-F643-AE28-35111AC75101}"/>
     <dgm:cxn modelId="{CFFAF3D3-9382-F44D-8900-47547D6FBF00}" type="presParOf" srcId="{F4EA08AA-9B67-7746-ACA4-2F534B3BCAAD}" destId="{504508B6-3F34-8741-8E3D-82122E32EDD7}" srcOrd="0" destOrd="0" presId="urn:microsoft.com/office/officeart/2005/8/layout/process1"/>
     <dgm:cxn modelId="{49689C09-ABE5-8446-8F60-34B6AE718E7B}" type="presParOf" srcId="{F4EA08AA-9B67-7746-ACA4-2F534B3BCAAD}" destId="{259FAD5D-155A-5E42-9899-9EC9730A809C}" srcOrd="1" destOrd="0" presId="urn:microsoft.com/office/officeart/2005/8/layout/process1"/>
     <dgm:cxn modelId="{2E2ACD0F-7A33-E14D-9A0A-9E98E1EFBFD3}" type="presParOf" srcId="{259FAD5D-155A-5E42-9899-9EC9730A809C}" destId="{30DCF6B7-7B1A-E04F-9094-8F1A311A69F1}" srcOrd="0" destOrd="0" presId="urn:microsoft.com/office/officeart/2005/8/layout/process1"/>
@@ -3134,7 +3190,7 @@
             <a:fld id="{A586203F-0298-CF4B-9AB9-9819A0A3EA75}" type="datetimeFigureOut">
               <a:rPr lang="en-US" smtClean="0"/>
               <a:pPr/>
-              <a:t>9/28/15</a:t>
+              <a:t>9/30/15</a:t>
             </a:fld>
             <a:endParaRPr lang="en-US"/>
           </a:p>
@@ -3301,7 +3357,7 @@
             <a:fld id="{E440938E-05C0-44C6-B1FF-F21A30AFD653}" type="datetimeFigureOut">
               <a:rPr lang="en-US" smtClean="0"/>
               <a:pPr/>
-              <a:t>9/28/15</a:t>
+              <a:t>9/30/15</a:t>
             </a:fld>
             <a:endParaRPr lang="en-US"/>
           </a:p>
@@ -4547,7 +4603,6 @@
               <a:rPr lang="en-US" baseline="0" dirty="0" smtClean="0"/>
               <a:t>Has recording started yet?</a:t>
             </a:r>
-            <a:endParaRPr lang="en-US" baseline="0" dirty="0" smtClean="0"/>
           </a:p>
         </p:txBody>
       </p:sp>
@@ -4639,7 +4694,6 @@
               <a:rPr lang="en-US" baseline="0" dirty="0" smtClean="0"/>
               <a:t>How about now? Recording yet?</a:t>
             </a:r>
-            <a:endParaRPr lang="en-US" baseline="0" dirty="0" smtClean="0"/>
           </a:p>
         </p:txBody>
       </p:sp>
@@ -15499,23 +15553,7 @@
                   <a:srgbClr val="008000"/>
                 </a:solidFill>
               </a:rPr>
-              <a:t>docker build </a:t>
-            </a:r>
-            <a:r>
-              <a:rPr lang="en-US" sz="2400" dirty="0">
-                <a:solidFill>
-                  <a:srgbClr val="008000"/>
-                </a:solidFill>
-              </a:rPr>
-              <a:t>-</a:t>
-            </a:r>
-            <a:r>
-              <a:rPr lang="en-US" sz="2400" dirty="0">
-                <a:solidFill>
-                  <a:srgbClr val="008000"/>
-                </a:solidFill>
-              </a:rPr>
-              <a:t>t </a:t>
+              <a:t>docker build -t </a:t>
             </a:r>
             <a:r>
               <a:rPr lang="en-US" sz="2400" dirty="0" err="1">
@@ -15523,23 +15561,7 @@
                   <a:srgbClr val="008000"/>
                 </a:solidFill>
               </a:rPr>
-              <a:t>gcr</a:t>
-            </a:r>
-            <a:r>
-              <a:rPr lang="en-US" sz="2400" dirty="0" err="1">
-                <a:solidFill>
-                  <a:srgbClr val="008000"/>
-                </a:solidFill>
-              </a:rPr>
-              <a:t>.</a:t>
-            </a:r>
-            <a:r>
-              <a:rPr lang="en-US" sz="2400" dirty="0" err="1">
-                <a:solidFill>
-                  <a:srgbClr val="008000"/>
-                </a:solidFill>
-              </a:rPr>
-              <a:t>io</a:t>
+              <a:t>gcr.io</a:t>
             </a:r>
             <a:r>
               <a:rPr lang="en-US" sz="2400" dirty="0" smtClean="0">
@@ -15605,15 +15627,7 @@
                   <a:srgbClr val="008000"/>
                 </a:solidFill>
               </a:rPr>
-              <a:t>run -d -P</a:t>
-            </a:r>
-            <a:r>
-              <a:rPr lang="en-US" sz="2400" dirty="0">
-                <a:solidFill>
-                  <a:srgbClr val="008000"/>
-                </a:solidFill>
-              </a:rPr>
-              <a:t> </a:t>
+              <a:t>run -d -P </a:t>
             </a:r>
             <a:r>
               <a:rPr lang="en-US" sz="2400" dirty="0" err="1">
@@ -15621,23 +15635,7 @@
                   <a:srgbClr val="008000"/>
                 </a:solidFill>
               </a:rPr>
-              <a:t>gcr</a:t>
-            </a:r>
-            <a:r>
-              <a:rPr lang="en-US" sz="2400" dirty="0" err="1">
-                <a:solidFill>
-                  <a:srgbClr val="008000"/>
-                </a:solidFill>
-              </a:rPr>
-              <a:t>.</a:t>
-            </a:r>
-            <a:r>
-              <a:rPr lang="en-US" sz="2400" dirty="0" err="1">
-                <a:solidFill>
-                  <a:srgbClr val="008000"/>
-                </a:solidFill>
-              </a:rPr>
-              <a:t>io</a:t>
+              <a:t>gcr.io</a:t>
             </a:r>
             <a:r>
               <a:rPr lang="en-US" sz="2400" dirty="0" smtClean="0">
@@ -15829,23 +15827,7 @@
                   <a:srgbClr val="008000"/>
                 </a:solidFill>
               </a:rPr>
-              <a:t>gcr</a:t>
-            </a:r>
-            <a:r>
-              <a:rPr lang="en-US" sz="2400" dirty="0" err="1">
-                <a:solidFill>
-                  <a:srgbClr val="008000"/>
-                </a:solidFill>
-              </a:rPr>
-              <a:t>.</a:t>
-            </a:r>
-            <a:r>
-              <a:rPr lang="en-US" sz="2400" dirty="0" err="1">
-                <a:solidFill>
-                  <a:srgbClr val="008000"/>
-                </a:solidFill>
-              </a:rPr>
-              <a:t>io</a:t>
+              <a:t>gcr.io</a:t>
             </a:r>
             <a:r>
               <a:rPr lang="en-US" sz="2400" dirty="0" smtClean="0">
@@ -15993,23 +15975,7 @@
                   <a:srgbClr val="008000"/>
                 </a:solidFill>
               </a:rPr>
-              <a:t>docker build </a:t>
-            </a:r>
-            <a:r>
-              <a:rPr lang="en-US" sz="2400" dirty="0">
-                <a:solidFill>
-                  <a:srgbClr val="008000"/>
-                </a:solidFill>
-              </a:rPr>
-              <a:t>-</a:t>
-            </a:r>
-            <a:r>
-              <a:rPr lang="en-US" sz="2400" dirty="0">
-                <a:solidFill>
-                  <a:srgbClr val="008000"/>
-                </a:solidFill>
-              </a:rPr>
-              <a:t>t </a:t>
+              <a:t>docker build -t </a:t>
             </a:r>
             <a:r>
               <a:rPr lang="en-US" sz="2400" dirty="0" err="1">
@@ -16017,23 +15983,7 @@
                   <a:srgbClr val="008000"/>
                 </a:solidFill>
               </a:rPr>
-              <a:t>gcr</a:t>
-            </a:r>
-            <a:r>
-              <a:rPr lang="en-US" sz="2400" dirty="0" err="1">
-                <a:solidFill>
-                  <a:srgbClr val="008000"/>
-                </a:solidFill>
-              </a:rPr>
-              <a:t>.</a:t>
-            </a:r>
-            <a:r>
-              <a:rPr lang="en-US" sz="2400" dirty="0" err="1">
-                <a:solidFill>
-                  <a:srgbClr val="008000"/>
-                </a:solidFill>
-              </a:rPr>
-              <a:t>io</a:t>
+              <a:t>gcr.io</a:t>
             </a:r>
             <a:r>
               <a:rPr lang="en-US" sz="2400" dirty="0" smtClean="0">
@@ -16099,15 +16049,7 @@
                   <a:srgbClr val="008000"/>
                 </a:solidFill>
               </a:rPr>
-              <a:t>run -d -P</a:t>
-            </a:r>
-            <a:r>
-              <a:rPr lang="en-US" sz="2400" dirty="0">
-                <a:solidFill>
-                  <a:srgbClr val="008000"/>
-                </a:solidFill>
-              </a:rPr>
-              <a:t> </a:t>
+              <a:t>run -d -P </a:t>
             </a:r>
             <a:r>
               <a:rPr lang="en-US" sz="2400" dirty="0" err="1">
@@ -16115,23 +16057,7 @@
                   <a:srgbClr val="008000"/>
                 </a:solidFill>
               </a:rPr>
-              <a:t>gcr</a:t>
-            </a:r>
-            <a:r>
-              <a:rPr lang="en-US" sz="2400" dirty="0" err="1">
-                <a:solidFill>
-                  <a:srgbClr val="008000"/>
-                </a:solidFill>
-              </a:rPr>
-              <a:t>.</a:t>
-            </a:r>
-            <a:r>
-              <a:rPr lang="en-US" sz="2400" dirty="0" err="1">
-                <a:solidFill>
-                  <a:srgbClr val="008000"/>
-                </a:solidFill>
-              </a:rPr>
-              <a:t>io</a:t>
+              <a:t>gcr.io</a:t>
             </a:r>
             <a:r>
               <a:rPr lang="en-US" sz="2400" dirty="0" smtClean="0">
@@ -16325,23 +16251,7 @@
                   <a:srgbClr val="008000"/>
                 </a:solidFill>
               </a:rPr>
-              <a:t>gcr</a:t>
-            </a:r>
-            <a:r>
-              <a:rPr lang="en-US" sz="2400" dirty="0" err="1">
-                <a:solidFill>
-                  <a:srgbClr val="008000"/>
-                </a:solidFill>
-              </a:rPr>
-              <a:t>.</a:t>
-            </a:r>
-            <a:r>
-              <a:rPr lang="en-US" sz="2400" dirty="0" err="1">
-                <a:solidFill>
-                  <a:srgbClr val="008000"/>
-                </a:solidFill>
-              </a:rPr>
-              <a:t>io</a:t>
+              <a:t>gcr.io</a:t>
             </a:r>
             <a:r>
               <a:rPr lang="en-US" sz="2400" dirty="0" smtClean="0">
@@ -16682,29 +16592,7 @@
                 <a:ea typeface="+mj-ea"/>
                 <a:cs typeface="Arial" pitchFamily="34" charset="0"/>
               </a:rPr>
-              <a:t>Deployment process visualized:</a:t>
-            </a:r>
-            <a:r>
-              <a:rPr lang="en-US" sz="2800" b="1" dirty="0" smtClean="0">
-                <a:gradFill>
-                  <a:gsLst>
-                    <a:gs pos="0">
-                      <a:schemeClr val="tx1"/>
-                    </a:gs>
-                    <a:gs pos="44000">
-                      <a:srgbClr val="01BBBB"/>
-                    </a:gs>
-                    <a:gs pos="100000">
-                      <a:schemeClr val="accent4"/>
-                    </a:gs>
-                  </a:gsLst>
-                  <a:lin ang="4800000" scaled="0"/>
-                </a:gradFill>
-                <a:latin typeface="Arial" pitchFamily="34" charset="0"/>
-                <a:ea typeface="+mj-ea"/>
-                <a:cs typeface="Arial" pitchFamily="34" charset="0"/>
-              </a:rPr>
-              <a:t> </a:t>
+              <a:t>Deployment process visualized: </a:t>
             </a:r>
             <a:endParaRPr lang="en-US" sz="2800" b="1" dirty="0">
               <a:gradFill>
@@ -18983,22 +18871,301 @@
         </p:nvSpPr>
         <p:spPr/>
         <p:txBody>
-          <a:bodyPr/>
+          <a:bodyPr>
+            <a:normAutofit fontScale="92500"/>
+          </a:bodyPr>
           <a:lstStyle/>
           <a:p>
             <a:r>
               <a:rPr lang="en-US" dirty="0" smtClean="0"/>
-              <a:t>Scaling the pods is also extremely easy. </a:t>
-            </a:r>
-          </a:p>
-          <a:p>
+              <a:t>Scaling the pods is also </a:t>
+            </a:r>
             <a:r>
               <a:rPr lang="en-US" dirty="0" smtClean="0"/>
-              <a:t>It is one command only, be it scaling up, or down, just by providing the number of replicas:</a:t>
+              <a:t>easy.</a:t>
+            </a:r>
+          </a:p>
+          <a:p>
+            <a:r>
+              <a:rPr lang="en-US" dirty="0" smtClean="0"/>
+              <a:t>Two levels here:</a:t>
             </a:r>
           </a:p>
           <a:p>
             <a:pPr lvl="1"/>
+            <a:r>
+              <a:rPr lang="en-US" dirty="0" smtClean="0"/>
+              <a:t>The VM cluster, our replication controller (Pods with containers) is running on</a:t>
+            </a:r>
+          </a:p>
+          <a:p>
+            <a:pPr lvl="1"/>
+            <a:r>
+              <a:rPr lang="en-US" dirty="0" smtClean="0"/>
+              <a:t>The actual number of pods</a:t>
+            </a:r>
+          </a:p>
+          <a:p>
+            <a:r>
+              <a:rPr lang="en-US" dirty="0" smtClean="0"/>
+              <a:t>Resizing the VM Cluster:</a:t>
+            </a:r>
+          </a:p>
+          <a:p>
+            <a:pPr lvl="1"/>
+            <a:r>
+              <a:rPr lang="en-US" dirty="0" smtClean="0"/>
+              <a:t>To manage the size of VM cluster, first get the name of the cluster group:</a:t>
+            </a:r>
+          </a:p>
+          <a:p>
+            <a:pPr lvl="2"/>
+            <a:r>
+              <a:rPr lang="en-US" dirty="0" smtClean="0">
+                <a:solidFill>
+                  <a:srgbClr val="008000"/>
+                </a:solidFill>
+              </a:rPr>
+              <a:t>$ </a:t>
+            </a:r>
+            <a:r>
+              <a:rPr lang="en-US" dirty="0" err="1" smtClean="0">
+                <a:solidFill>
+                  <a:srgbClr val="008000"/>
+                </a:solidFill>
+              </a:rPr>
+              <a:t>gcloud</a:t>
+            </a:r>
+            <a:r>
+              <a:rPr lang="en-US" dirty="0" smtClean="0">
+                <a:solidFill>
+                  <a:srgbClr val="008000"/>
+                </a:solidFill>
+              </a:rPr>
+              <a:t> </a:t>
+            </a:r>
+            <a:r>
+              <a:rPr lang="en-US" dirty="0">
+                <a:solidFill>
+                  <a:srgbClr val="008000"/>
+                </a:solidFill>
+              </a:rPr>
+              <a:t>container clusters describe subscribers --format </a:t>
+            </a:r>
+            <a:r>
+              <a:rPr lang="en-US" dirty="0" err="1">
+                <a:solidFill>
+                  <a:srgbClr val="008000"/>
+                </a:solidFill>
+              </a:rPr>
+              <a:t>yaml</a:t>
+            </a:r>
+            <a:r>
+              <a:rPr lang="en-US" dirty="0">
+                <a:solidFill>
+                  <a:srgbClr val="008000"/>
+                </a:solidFill>
+              </a:rPr>
+              <a:t> | </a:t>
+            </a:r>
+            <a:r>
+              <a:rPr lang="en-US" dirty="0" err="1">
+                <a:solidFill>
+                  <a:srgbClr val="008000"/>
+                </a:solidFill>
+              </a:rPr>
+              <a:t>grep</a:t>
+            </a:r>
+            <a:r>
+              <a:rPr lang="en-US" dirty="0">
+                <a:solidFill>
+                  <a:srgbClr val="008000"/>
+                </a:solidFill>
+              </a:rPr>
+              <a:t> -A 1 </a:t>
+            </a:r>
+            <a:r>
+              <a:rPr lang="en-US" dirty="0" err="1">
+                <a:solidFill>
+                  <a:srgbClr val="008000"/>
+                </a:solidFill>
+              </a:rPr>
+              <a:t>instanceGroupUrls</a:t>
+            </a:r>
+            <a:endParaRPr lang="en-US" dirty="0">
+              <a:solidFill>
+                <a:srgbClr val="008000"/>
+              </a:solidFill>
+            </a:endParaRPr>
+          </a:p>
+          <a:p>
+            <a:pPr lvl="2"/>
+            <a:r>
+              <a:rPr lang="en-US" dirty="0" err="1">
+                <a:solidFill>
+                  <a:srgbClr val="008000"/>
+                </a:solidFill>
+              </a:rPr>
+              <a:t>instanceGroupUrls</a:t>
+            </a:r>
+            <a:r>
+              <a:rPr lang="en-US" dirty="0">
+                <a:solidFill>
+                  <a:srgbClr val="008000"/>
+                </a:solidFill>
+              </a:rPr>
+              <a:t>:</a:t>
+            </a:r>
+          </a:p>
+          <a:p>
+            <a:pPr lvl="2"/>
+            <a:r>
+              <a:rPr lang="en-US" dirty="0">
+                <a:solidFill>
+                  <a:srgbClr val="008000"/>
+                </a:solidFill>
+              </a:rPr>
+              <a:t>- https://</a:t>
+            </a:r>
+            <a:r>
+              <a:rPr lang="en-US" dirty="0" err="1">
+                <a:solidFill>
+                  <a:srgbClr val="008000"/>
+                </a:solidFill>
+              </a:rPr>
+              <a:t>www.googleapis.com</a:t>
+            </a:r>
+            <a:r>
+              <a:rPr lang="en-US" dirty="0">
+                <a:solidFill>
+                  <a:srgbClr val="008000"/>
+                </a:solidFill>
+              </a:rPr>
+              <a:t>/</a:t>
+            </a:r>
+            <a:r>
+              <a:rPr lang="en-US" dirty="0" err="1">
+                <a:solidFill>
+                  <a:srgbClr val="008000"/>
+                </a:solidFill>
+              </a:rPr>
+              <a:t>replicapool</a:t>
+            </a:r>
+            <a:r>
+              <a:rPr lang="en-US" dirty="0">
+                <a:solidFill>
+                  <a:srgbClr val="008000"/>
+                </a:solidFill>
+              </a:rPr>
+              <a:t>/v1beta2/projects/subscribers-1084/zones/us-central1-f/</a:t>
+            </a:r>
+            <a:r>
+              <a:rPr lang="en-US" dirty="0" err="1">
+                <a:solidFill>
+                  <a:srgbClr val="008000"/>
+                </a:solidFill>
+              </a:rPr>
+              <a:t>instanceGroupManagers</a:t>
+            </a:r>
+            <a:r>
+              <a:rPr lang="en-US" dirty="0">
+                <a:solidFill>
+                  <a:srgbClr val="008000"/>
+                </a:solidFill>
+              </a:rPr>
+              <a:t>/</a:t>
+            </a:r>
+            <a:r>
+              <a:rPr lang="en-US" b="1" dirty="0">
+                <a:solidFill>
+                  <a:srgbClr val="008000"/>
+                </a:solidFill>
+              </a:rPr>
+              <a:t>gke-subscribers-fefe8aac-group</a:t>
+            </a:r>
+            <a:endParaRPr lang="en-US" b="1" dirty="0" smtClean="0">
+              <a:solidFill>
+                <a:srgbClr val="008000"/>
+              </a:solidFill>
+            </a:endParaRPr>
+          </a:p>
+          <a:p>
+            <a:pPr lvl="1"/>
+            <a:r>
+              <a:rPr lang="en-US" dirty="0" smtClean="0"/>
+              <a:t>To resize (depending on the value of size </a:t>
+            </a:r>
+            <a:r>
+              <a:rPr lang="en-US" dirty="0" err="1" smtClean="0"/>
+              <a:t>param</a:t>
+            </a:r>
+            <a:r>
+              <a:rPr lang="en-US" dirty="0" smtClean="0"/>
+              <a:t> we can add or remove VM’s to the group): </a:t>
+            </a:r>
+          </a:p>
+          <a:p>
+            <a:pPr lvl="2"/>
+            <a:r>
+              <a:rPr lang="en-US" dirty="0" smtClean="0">
+                <a:solidFill>
+                  <a:srgbClr val="008000"/>
+                </a:solidFill>
+              </a:rPr>
+              <a:t>$ </a:t>
+            </a:r>
+            <a:r>
+              <a:rPr lang="en-US" dirty="0" err="1" smtClean="0">
+                <a:solidFill>
+                  <a:srgbClr val="008000"/>
+                </a:solidFill>
+              </a:rPr>
+              <a:t>gcloud</a:t>
+            </a:r>
+            <a:r>
+              <a:rPr lang="en-US" dirty="0" smtClean="0">
+                <a:solidFill>
+                  <a:srgbClr val="008000"/>
+                </a:solidFill>
+              </a:rPr>
+              <a:t> </a:t>
+            </a:r>
+            <a:r>
+              <a:rPr lang="en-US" dirty="0">
+                <a:solidFill>
+                  <a:srgbClr val="008000"/>
+                </a:solidFill>
+              </a:rPr>
+              <a:t>compute instance-groups managed resize gke-subscribers-fefe8aac-group --zone us-central1-f --size </a:t>
+            </a:r>
+            <a:r>
+              <a:rPr lang="en-US" b="1" dirty="0">
+                <a:solidFill>
+                  <a:srgbClr val="008000"/>
+                </a:solidFill>
+              </a:rPr>
+              <a:t>5</a:t>
+            </a:r>
+          </a:p>
+          <a:p>
+            <a:r>
+              <a:rPr lang="en-US" dirty="0" smtClean="0"/>
+              <a:t>Resizing number of Pods:</a:t>
+            </a:r>
+          </a:p>
+          <a:p>
+            <a:pPr lvl="1"/>
+            <a:r>
+              <a:rPr lang="en-US" dirty="0" smtClean="0"/>
+              <a:t>It </a:t>
+            </a:r>
+            <a:r>
+              <a:rPr lang="en-US" dirty="0" smtClean="0"/>
+              <a:t>is one command only, be it scaling up, or down, just by providing the number of replicas:</a:t>
+            </a:r>
+          </a:p>
+          <a:p>
+            <a:pPr lvl="2"/>
             <a:r>
               <a:rPr lang="en-US" dirty="0" smtClean="0">
                 <a:solidFill>
@@ -19184,8 +19351,8 @@
         </p:nvSpPr>
         <p:spPr>
           <a:xfrm>
-            <a:off x="1016000" y="1913467"/>
-            <a:ext cx="12174877" cy="6324807"/>
+            <a:off x="589558" y="1298576"/>
+            <a:ext cx="14040842" cy="7571303"/>
           </a:xfrm>
           <a:prstGeom prst="rect">
             <a:avLst/>
@@ -19200,7 +19367,7 @@
           <a:p>
             <a:r>
               <a:rPr lang="en-US" dirty="0" smtClean="0"/>
-              <a:t>Docker video:</a:t>
+              <a:t>Video of the demo:</a:t>
             </a:r>
           </a:p>
           <a:p>
@@ -19208,12 +19375,40 @@
               <a:rPr lang="en-US" dirty="0">
                 <a:hlinkClick r:id="rId2"/>
               </a:rPr>
-              <a:t>https://www.youtube.com/watch?v=Q5POuMHxW-</a:t>
+              <a:t>https://rovicorp.webex.com/rovicorp/ldr.php?RCID=</a:t>
             </a:r>
             <a:r>
               <a:rPr lang="en-US" dirty="0" smtClean="0">
                 <a:hlinkClick r:id="rId2"/>
               </a:rPr>
+              <a:t>6b112a99f921ad760d843cd826098838</a:t>
+            </a:r>
+            <a:endParaRPr lang="en-US" dirty="0" smtClean="0"/>
+          </a:p>
+          <a:p>
+            <a:endParaRPr lang="en-US" dirty="0"/>
+          </a:p>
+          <a:p>
+            <a:r>
+              <a:rPr lang="en-US" dirty="0" smtClean="0"/>
+              <a:t>Docker </a:t>
+            </a:r>
+            <a:r>
+              <a:rPr lang="en-US" dirty="0" smtClean="0"/>
+              <a:t>video:</a:t>
+            </a:r>
+          </a:p>
+          <a:p>
+            <a:r>
+              <a:rPr lang="en-US" dirty="0">
+                <a:hlinkClick r:id="rId3"/>
+              </a:rPr>
+              <a:t>https://www.youtube.com/watch?v=Q5POuMHxW-</a:t>
+            </a:r>
+            <a:r>
+              <a:rPr lang="en-US" dirty="0" smtClean="0">
+                <a:hlinkClick r:id="rId3"/>
+              </a:rPr>
               <a:t>0</a:t>
             </a:r>
             <a:endParaRPr lang="en-US" dirty="0" smtClean="0"/>
@@ -19230,13 +19425,13 @@
           <a:p>
             <a:r>
               <a:rPr lang="en-US" dirty="0">
-                <a:hlinkClick r:id="rId3"/>
+                <a:hlinkClick r:id="rId4"/>
               </a:rPr>
               <a:t>http://slides.com/krak3n/docker/fullscreen#/</a:t>
             </a:r>
             <a:r>
               <a:rPr lang="en-US" dirty="0" smtClean="0">
-                <a:hlinkClick r:id="rId3"/>
+                <a:hlinkClick r:id="rId4"/>
               </a:rPr>
               <a:t>1</a:t>
             </a:r>
@@ -19254,13 +19449,13 @@
           <a:p>
             <a:r>
               <a:rPr lang="en-US" dirty="0">
-                <a:hlinkClick r:id="rId4"/>
+                <a:hlinkClick r:id="rId5"/>
               </a:rPr>
               <a:t>http://104.197.141.51/subscriber?id=</a:t>
             </a:r>
             <a:r>
               <a:rPr lang="en-US" dirty="0" smtClean="0">
-                <a:hlinkClick r:id="rId4"/>
+                <a:hlinkClick r:id="rId5"/>
               </a:rPr>
               <a:t>12</a:t>
             </a:r>
@@ -19278,13 +19473,13 @@
           <a:p>
             <a:r>
               <a:rPr lang="en-US" dirty="0">
-                <a:hlinkClick r:id="rId5"/>
+                <a:hlinkClick r:id="rId6"/>
               </a:rPr>
               <a:t>http://104.197.108.224/subscribers/</a:t>
             </a:r>
             <a:r>
               <a:rPr lang="en-US" dirty="0" smtClean="0">
-                <a:hlinkClick r:id="rId5"/>
+                <a:hlinkClick r:id="rId6"/>
               </a:rPr>
               <a:t>dynamicsubscribers</a:t>
             </a:r>
@@ -19314,13 +19509,13 @@
           <a:p>
             <a:r>
               <a:rPr lang="en-US" dirty="0">
-                <a:hlinkClick r:id="rId6"/>
+                <a:hlinkClick r:id="rId7"/>
               </a:rPr>
               <a:t>https://github.com/gevgev/</a:t>
             </a:r>
             <a:r>
               <a:rPr lang="en-US" dirty="0" smtClean="0">
-                <a:hlinkClick r:id="rId6"/>
+                <a:hlinkClick r:id="rId7"/>
               </a:rPr>
               <a:t>subscribers.git</a:t>
             </a:r>

</xml_diff>